<commit_message>
Adding angular demo with SPA
</commit_message>
<xml_diff>
--- a/Dejan/Single-Page-Applications/Single-Page-Applications.pptx
+++ b/Dejan/Single-Page-Applications/Single-Page-Applications.pptx
@@ -7,6 +7,7 @@
   <p:sldIdLst>
     <p:sldId id="256" r:id="rId2"/>
     <p:sldId id="257" r:id="rId3"/>
+    <p:sldId id="258" r:id="rId4"/>
   </p:sldIdLst>
   <p:sldSz cx="9144000" cy="6858000" type="screen4x3"/>
   <p:notesSz cx="6858000" cy="9144000"/>
@@ -290,7 +291,7 @@
             <a:fld id="{1D8BD707-D9CF-40AE-B4C6-C98DA3205C09}" type="datetimeFigureOut">
               <a:rPr lang="en-US" smtClean="0"/>
               <a:pPr/>
-              <a:t>4/17/2015</a:t>
+              <a:t>4/19/2015</a:t>
             </a:fld>
             <a:endParaRPr lang="en-US"/>
           </a:p>
@@ -457,7 +458,7 @@
             <a:fld id="{1D8BD707-D9CF-40AE-B4C6-C98DA3205C09}" type="datetimeFigureOut">
               <a:rPr lang="en-US" smtClean="0"/>
               <a:pPr/>
-              <a:t>4/17/2015</a:t>
+              <a:t>4/19/2015</a:t>
             </a:fld>
             <a:endParaRPr lang="en-US"/>
           </a:p>
@@ -634,7 +635,7 @@
             <a:fld id="{1D8BD707-D9CF-40AE-B4C6-C98DA3205C09}" type="datetimeFigureOut">
               <a:rPr lang="en-US" smtClean="0"/>
               <a:pPr/>
-              <a:t>4/17/2015</a:t>
+              <a:t>4/19/2015</a:t>
             </a:fld>
             <a:endParaRPr lang="en-US"/>
           </a:p>
@@ -801,7 +802,7 @@
             <a:fld id="{1D8BD707-D9CF-40AE-B4C6-C98DA3205C09}" type="datetimeFigureOut">
               <a:rPr lang="en-US" smtClean="0"/>
               <a:pPr/>
-              <a:t>4/17/2015</a:t>
+              <a:t>4/19/2015</a:t>
             </a:fld>
             <a:endParaRPr lang="en-US"/>
           </a:p>
@@ -1044,7 +1045,7 @@
             <a:fld id="{1D8BD707-D9CF-40AE-B4C6-C98DA3205C09}" type="datetimeFigureOut">
               <a:rPr lang="en-US" smtClean="0"/>
               <a:pPr/>
-              <a:t>4/17/2015</a:t>
+              <a:t>4/19/2015</a:t>
             </a:fld>
             <a:endParaRPr lang="en-US"/>
           </a:p>
@@ -1329,7 +1330,7 @@
             <a:fld id="{1D8BD707-D9CF-40AE-B4C6-C98DA3205C09}" type="datetimeFigureOut">
               <a:rPr lang="en-US" smtClean="0"/>
               <a:pPr/>
-              <a:t>4/17/2015</a:t>
+              <a:t>4/19/2015</a:t>
             </a:fld>
             <a:endParaRPr lang="en-US"/>
           </a:p>
@@ -1748,7 +1749,7 @@
             <a:fld id="{1D8BD707-D9CF-40AE-B4C6-C98DA3205C09}" type="datetimeFigureOut">
               <a:rPr lang="en-US" smtClean="0"/>
               <a:pPr/>
-              <a:t>4/17/2015</a:t>
+              <a:t>4/19/2015</a:t>
             </a:fld>
             <a:endParaRPr lang="en-US"/>
           </a:p>
@@ -1863,7 +1864,7 @@
             <a:fld id="{1D8BD707-D9CF-40AE-B4C6-C98DA3205C09}" type="datetimeFigureOut">
               <a:rPr lang="en-US" smtClean="0"/>
               <a:pPr/>
-              <a:t>4/17/2015</a:t>
+              <a:t>4/19/2015</a:t>
             </a:fld>
             <a:endParaRPr lang="en-US"/>
           </a:p>
@@ -1955,7 +1956,7 @@
             <a:fld id="{1D8BD707-D9CF-40AE-B4C6-C98DA3205C09}" type="datetimeFigureOut">
               <a:rPr lang="en-US" smtClean="0"/>
               <a:pPr/>
-              <a:t>4/17/2015</a:t>
+              <a:t>4/19/2015</a:t>
             </a:fld>
             <a:endParaRPr lang="en-US"/>
           </a:p>
@@ -2229,7 +2230,7 @@
             <a:fld id="{1D8BD707-D9CF-40AE-B4C6-C98DA3205C09}" type="datetimeFigureOut">
               <a:rPr lang="en-US" smtClean="0"/>
               <a:pPr/>
-              <a:t>4/17/2015</a:t>
+              <a:t>4/19/2015</a:t>
             </a:fld>
             <a:endParaRPr lang="en-US"/>
           </a:p>
@@ -2479,7 +2480,7 @@
             <a:fld id="{1D8BD707-D9CF-40AE-B4C6-C98DA3205C09}" type="datetimeFigureOut">
               <a:rPr lang="en-US" smtClean="0"/>
               <a:pPr/>
-              <a:t>4/17/2015</a:t>
+              <a:t>4/19/2015</a:t>
             </a:fld>
             <a:endParaRPr lang="en-US"/>
           </a:p>
@@ -2689,7 +2690,7 @@
             <a:fld id="{1D8BD707-D9CF-40AE-B4C6-C98DA3205C09}" type="datetimeFigureOut">
               <a:rPr lang="en-US" smtClean="0"/>
               <a:pPr/>
-              <a:t>4/17/2015</a:t>
+              <a:t>4/19/2015</a:t>
             </a:fld>
             <a:endParaRPr lang="en-US"/>
           </a:p>
@@ -3246,8 +3247,19 @@
           <a:p>
             <a:r>
               <a:rPr lang="en-AU" dirty="0" smtClean="0"/>
-              <a:t>Full MVC (model-view-controller) framework</a:t>
-            </a:r>
+              <a:t>Full MVC (model-view-controller) </a:t>
+            </a:r>
+            <a:r>
+              <a:rPr lang="en-AU" dirty="0" smtClean="0"/>
+              <a:t>framework</a:t>
+            </a:r>
+          </a:p>
+          <a:p>
+            <a:r>
+              <a:rPr lang="en-AU" dirty="0" smtClean="0"/>
+              <a:t>Modules</a:t>
+            </a:r>
+            <a:endParaRPr lang="en-AU" dirty="0" smtClean="0"/>
           </a:p>
           <a:p>
             <a:r>
@@ -3270,16 +3282,12 @@
           <a:p>
             <a:r>
               <a:rPr lang="en-AU" dirty="0" smtClean="0"/>
-              <a:t>Widgets = directives</a:t>
-            </a:r>
-          </a:p>
-          <a:p>
+              <a:t>Widgets = </a:t>
+            </a:r>
             <a:r>
               <a:rPr lang="en-AU" dirty="0" smtClean="0"/>
-              <a:t>Testing ability</a:t>
-            </a:r>
-          </a:p>
-          <a:p>
+              <a:t>directives</a:t>
+            </a:r>
             <a:endParaRPr lang="en-AU" dirty="0" smtClean="0"/>
           </a:p>
           <a:p>
@@ -3294,6 +3302,59 @@
     <p:extLst>
       <p:ext uri="{BB962C8B-B14F-4D97-AF65-F5344CB8AC3E}">
         <p14:creationId xmlns:p14="http://schemas.microsoft.com/office/powerpoint/2010/main" val="1383622426"/>
+      </p:ext>
+    </p:extLst>
+  </p:cSld>
+  <p:clrMapOvr>
+    <a:masterClrMapping/>
+  </p:clrMapOvr>
+</p:sld>
+</file>
+
+<file path=ppt/slides/slide3.xml><?xml version="1.0" encoding="utf-8"?>
+<p:sld xmlns:a="http://schemas.openxmlformats.org/drawingml/2006/main" xmlns:r="http://schemas.openxmlformats.org/officeDocument/2006/relationships" xmlns:p="http://schemas.openxmlformats.org/presentationml/2006/main">
+  <p:cSld>
+    <p:spTree>
+      <p:nvGrpSpPr>
+        <p:cNvPr id="1" name=""/>
+        <p:cNvGrpSpPr/>
+        <p:nvPr/>
+      </p:nvGrpSpPr>
+      <p:grpSpPr>
+        <a:xfrm>
+          <a:off x="0" y="0"/>
+          <a:ext cx="0" cy="0"/>
+          <a:chOff x="0" y="0"/>
+          <a:chExt cx="0" cy="0"/>
+        </a:xfrm>
+      </p:grpSpPr>
+      <p:sp>
+        <p:nvSpPr>
+          <p:cNvPr id="2" name="Title 1"/>
+          <p:cNvSpPr>
+            <a:spLocks noGrp="1"/>
+          </p:cNvSpPr>
+          <p:nvPr>
+            <p:ph type="title"/>
+          </p:nvPr>
+        </p:nvSpPr>
+        <p:spPr/>
+        <p:txBody>
+          <a:bodyPr/>
+          <a:lstStyle/>
+          <a:p>
+            <a:r>
+              <a:rPr lang="en-AU" dirty="0" smtClean="0"/>
+              <a:t>Demo</a:t>
+            </a:r>
+            <a:endParaRPr lang="en-AU" dirty="0"/>
+          </a:p>
+        </p:txBody>
+      </p:sp>
+    </p:spTree>
+    <p:extLst>
+      <p:ext uri="{BB962C8B-B14F-4D97-AF65-F5344CB8AC3E}">
+        <p14:creationId xmlns:p14="http://schemas.microsoft.com/office/powerpoint/2010/main" val="3095398143"/>
       </p:ext>
     </p:extLst>
   </p:cSld>

</xml_diff>